<commit_message>
add about cloning repo
</commit_message>
<xml_diff>
--- a/Workshops/1-R-taster.pptx
+++ b/Workshops/1-R-taster.pptx
@@ -8,6 +8,11 @@
     <p:sldId id="256" r:id="rId2"/>
     <p:sldId id="257" r:id="rId3"/>
     <p:sldId id="258" r:id="rId4"/>
+    <p:sldId id="259" r:id="rId5"/>
+    <p:sldId id="260" r:id="rId6"/>
+    <p:sldId id="261" r:id="rId7"/>
+    <p:sldId id="262" r:id="rId8"/>
+    <p:sldId id="263" r:id="rId9"/>
   </p:sldIdLst>
   <p:sldSz cx="12192000" cy="6858000"/>
   <p:notesSz cx="6858000" cy="9144000"/>
@@ -3609,6 +3614,13 @@
             <a:pPr lvl="1"/>
             <a:r>
               <a:rPr/>
+              <a:t>download a project from Github into RStudio</a:t>
+            </a:r>
+          </a:p>
+          <a:p>
+            <a:pPr lvl="1"/>
+            <a:r>
+              <a:rPr/>
               <a:t>read in data from a file</a:t>
             </a:r>
           </a:p>
@@ -3635,6 +3647,489 @@
           </a:p>
         </p:txBody>
       </p:sp>
+    </p:spTree>
+  </p:cSld>
+</p:sld>
+</file>
+
+<file path=ppt/slides/slide4.xml><?xml version="1.0" encoding="utf-8"?>
+<p:sld xmlns:a="http://schemas.openxmlformats.org/drawingml/2006/main" xmlns:r="http://schemas.openxmlformats.org/officeDocument/2006/relationships" xmlns:p="http://schemas.openxmlformats.org/presentationml/2006/main">
+  <p:cSld>
+    <p:spTree>
+      <p:nvGrpSpPr>
+        <p:cNvPr id="1" name=""/>
+        <p:cNvGrpSpPr/>
+        <p:nvPr/>
+      </p:nvGrpSpPr>
+      <p:grpSpPr>
+        <a:xfrm>
+          <a:off x="0" y="0"/>
+          <a:ext cx="0" cy="0"/>
+          <a:chOff x="0" y="0"/>
+          <a:chExt cx="0" cy="0"/>
+        </a:xfrm>
+      </p:grpSpPr>
+      <p:sp>
+        <p:nvSpPr>
+          <p:cNvPr id="2" name="Title 1">
+            <a:extLst>
+              <a:ext uri="{FF2B5EF4-FFF2-40B4-BE49-F238E27FC236}">
+                <a16:creationId xmlns:a16="http://schemas.microsoft.com/office/drawing/2014/main" id="{5567D468-EE70-CD4E-A3AC-039CC11EF1FB}"/>
+              </a:ext>
+            </a:extLst>
+          </p:cNvPr>
+          <p:cNvSpPr>
+            <a:spLocks noGrp="1"/>
+          </p:cNvSpPr>
+          <p:nvPr>
+            <p:ph type="title"/>
+          </p:nvPr>
+        </p:nvSpPr>
+        <p:spPr/>
+        <p:txBody>
+          <a:bodyPr/>
+          <a:lstStyle/>
+          <a:p>
+            <a:pPr lvl="0" marL="0" indent="0">
+              <a:buNone/>
+            </a:pPr>
+            <a:r>
+              <a:rPr/>
+              <a:t>download</a:t>
+            </a:r>
+            <a:r>
+              <a:rPr/>
+              <a:t> </a:t>
+            </a:r>
+            <a:r>
+              <a:rPr/>
+              <a:t>a</a:t>
+            </a:r>
+            <a:r>
+              <a:rPr/>
+              <a:t> </a:t>
+            </a:r>
+            <a:r>
+              <a:rPr/>
+              <a:t>project</a:t>
+            </a:r>
+            <a:r>
+              <a:rPr/>
+              <a:t> </a:t>
+            </a:r>
+            <a:r>
+              <a:rPr/>
+              <a:t>from</a:t>
+            </a:r>
+            <a:r>
+              <a:rPr/>
+              <a:t> </a:t>
+            </a:r>
+            <a:r>
+              <a:rPr/>
+              <a:t>Github</a:t>
+            </a:r>
+            <a:r>
+              <a:rPr/>
+              <a:t> </a:t>
+            </a:r>
+            <a:r>
+              <a:rPr/>
+              <a:t>into</a:t>
+            </a:r>
+            <a:r>
+              <a:rPr/>
+              <a:t> </a:t>
+            </a:r>
+            <a:r>
+              <a:rPr/>
+              <a:t>RStudio</a:t>
+            </a:r>
+          </a:p>
+        </p:txBody>
+      </p:sp>
+      <p:pic>
+        <p:nvPicPr>
+          <p:cNvPr descr="../Images/00-01-new-project.png" id="0" name="Picture 1"/>
+          <p:cNvPicPr>
+            <a:picLocks noGrp="1" noChangeAspect="1"/>
+          </p:cNvPicPr>
+          <p:nvPr/>
+        </p:nvPicPr>
+        <p:blipFill>
+          <a:blip r:embed="rId2"/>
+          <a:stretch>
+            <a:fillRect/>
+          </a:stretch>
+        </p:blipFill>
+        <p:spPr bwMode="auto">
+          <a:xfrm>
+            <a:off x="2667000" y="1816100"/>
+            <a:ext cx="6858000" cy="4343400"/>
+          </a:xfrm>
+          <a:prstGeom prst="rect">
+            <a:avLst/>
+          </a:prstGeom>
+          <a:noFill/>
+          <a:ln w="9525">
+            <a:noFill/>
+            <a:headEnd/>
+            <a:tailEnd/>
+          </a:ln>
+        </p:spPr>
+      </p:pic>
+    </p:spTree>
+  </p:cSld>
+</p:sld>
+</file>
+
+<file path=ppt/slides/slide5.xml><?xml version="1.0" encoding="utf-8"?>
+<p:sld xmlns:a="http://schemas.openxmlformats.org/drawingml/2006/main" xmlns:r="http://schemas.openxmlformats.org/officeDocument/2006/relationships" xmlns:p="http://schemas.openxmlformats.org/presentationml/2006/main">
+  <p:cSld>
+    <p:spTree>
+      <p:nvGrpSpPr>
+        <p:cNvPr id="1" name=""/>
+        <p:cNvGrpSpPr/>
+        <p:nvPr/>
+      </p:nvGrpSpPr>
+      <p:grpSpPr>
+        <a:xfrm>
+          <a:off x="0" y="0"/>
+          <a:ext cx="0" cy="0"/>
+          <a:chOff x="0" y="0"/>
+          <a:chExt cx="0" cy="0"/>
+        </a:xfrm>
+      </p:grpSpPr>
+      <p:pic>
+        <p:nvPicPr>
+          <p:cNvPr descr="../Images/00-02-from-version-control.png" id="0" name="Picture 1"/>
+          <p:cNvPicPr>
+            <a:picLocks noGrp="1" noChangeAspect="1"/>
+          </p:cNvPicPr>
+          <p:nvPr/>
+        </p:nvPicPr>
+        <p:blipFill>
+          <a:blip r:embed="rId2"/>
+          <a:stretch>
+            <a:fillRect/>
+          </a:stretch>
+        </p:blipFill>
+        <p:spPr bwMode="auto">
+          <a:xfrm>
+            <a:off x="3060700" y="1816100"/>
+            <a:ext cx="6057900" cy="4343400"/>
+          </a:xfrm>
+          <a:prstGeom prst="rect">
+            <a:avLst/>
+          </a:prstGeom>
+          <a:noFill/>
+          <a:ln w="9525">
+            <a:noFill/>
+            <a:headEnd/>
+            <a:tailEnd/>
+          </a:ln>
+        </p:spPr>
+      </p:pic>
+    </p:spTree>
+  </p:cSld>
+</p:sld>
+</file>
+
+<file path=ppt/slides/slide6.xml><?xml version="1.0" encoding="utf-8"?>
+<p:sld xmlns:a="http://schemas.openxmlformats.org/drawingml/2006/main" xmlns:r="http://schemas.openxmlformats.org/officeDocument/2006/relationships" xmlns:p="http://schemas.openxmlformats.org/presentationml/2006/main">
+  <p:cSld>
+    <p:spTree>
+      <p:nvGrpSpPr>
+        <p:cNvPr id="1" name=""/>
+        <p:cNvGrpSpPr/>
+        <p:nvPr/>
+      </p:nvGrpSpPr>
+      <p:grpSpPr>
+        <a:xfrm>
+          <a:off x="0" y="0"/>
+          <a:ext cx="0" cy="0"/>
+          <a:chOff x="0" y="0"/>
+          <a:chExt cx="0" cy="0"/>
+        </a:xfrm>
+      </p:grpSpPr>
+      <p:pic>
+        <p:nvPicPr>
+          <p:cNvPr descr="../Images/00-03-from-git.png" id="0" name="Picture 1"/>
+          <p:cNvPicPr>
+            <a:picLocks noGrp="1" noChangeAspect="1"/>
+          </p:cNvPicPr>
+          <p:nvPr/>
+        </p:nvPicPr>
+        <p:blipFill>
+          <a:blip r:embed="rId2"/>
+          <a:stretch>
+            <a:fillRect/>
+          </a:stretch>
+        </p:blipFill>
+        <p:spPr bwMode="auto">
+          <a:xfrm>
+            <a:off x="3073400" y="1816100"/>
+            <a:ext cx="6032500" cy="4343400"/>
+          </a:xfrm>
+          <a:prstGeom prst="rect">
+            <a:avLst/>
+          </a:prstGeom>
+          <a:noFill/>
+          <a:ln w="9525">
+            <a:noFill/>
+            <a:headEnd/>
+            <a:tailEnd/>
+          </a:ln>
+        </p:spPr>
+      </p:pic>
+    </p:spTree>
+  </p:cSld>
+</p:sld>
+</file>
+
+<file path=ppt/slides/slide7.xml><?xml version="1.0" encoding="utf-8"?>
+<p:sld xmlns:a="http://schemas.openxmlformats.org/drawingml/2006/main" xmlns:r="http://schemas.openxmlformats.org/officeDocument/2006/relationships" xmlns:p="http://schemas.openxmlformats.org/presentationml/2006/main">
+  <p:cSld>
+    <p:spTree>
+      <p:nvGrpSpPr>
+        <p:cNvPr id="1" name=""/>
+        <p:cNvGrpSpPr/>
+        <p:nvPr/>
+      </p:nvGrpSpPr>
+      <p:grpSpPr>
+        <a:xfrm>
+          <a:off x="0" y="0"/>
+          <a:ext cx="0" cy="0"/>
+          <a:chOff x="0" y="0"/>
+          <a:chExt cx="0" cy="0"/>
+        </a:xfrm>
+      </p:grpSpPr>
+      <p:sp>
+        <p:nvSpPr>
+          <p:cNvPr id="2" name="Title 1">
+            <a:extLst>
+              <a:ext uri="{FF2B5EF4-FFF2-40B4-BE49-F238E27FC236}">
+                <a16:creationId xmlns:a16="http://schemas.microsoft.com/office/drawing/2014/main" id="{5567D468-EE70-CD4E-A3AC-039CC11EF1FB}"/>
+              </a:ext>
+            </a:extLst>
+          </p:cNvPr>
+          <p:cNvSpPr>
+            <a:spLocks noGrp="1"/>
+          </p:cNvSpPr>
+          <p:nvPr>
+            <p:ph type="title"/>
+          </p:nvPr>
+        </p:nvSpPr>
+        <p:spPr/>
+        <p:txBody>
+          <a:bodyPr/>
+          <a:lstStyle/>
+          <a:p>
+            <a:pPr lvl="0" marL="0" indent="0">
+              <a:buNone/>
+            </a:pPr>
+            <a:r>
+              <a:rPr/>
+              <a:t>Copy</a:t>
+            </a:r>
+            <a:r>
+              <a:rPr/>
+              <a:t> </a:t>
+            </a:r>
+            <a:r>
+              <a:rPr/>
+              <a:t>into</a:t>
+            </a:r>
+            <a:r>
+              <a:rPr/>
+              <a:t> </a:t>
+            </a:r>
+            <a:r>
+              <a:rPr/>
+              <a:t>first</a:t>
+            </a:r>
+            <a:r>
+              <a:rPr/>
+              <a:t> </a:t>
+            </a:r>
+            <a:r>
+              <a:rPr/>
+              <a:t>box</a:t>
+            </a:r>
+            <a:r>
+              <a:rPr/>
+              <a:t> </a:t>
+            </a:r>
+            <a:r>
+              <a:rPr b="1">
+                <a:hlinkClick r:id="rId2"/>
+              </a:rPr>
+              <a:t>https://github.com/ucl-criu/learning-datascience</a:t>
+            </a:r>
+          </a:p>
+        </p:txBody>
+      </p:sp>
+      <p:pic>
+        <p:nvPicPr>
+          <p:cNvPr descr="../Images/00-04-git-url.png" id="0" name="Picture 1"/>
+          <p:cNvPicPr>
+            <a:picLocks noGrp="1" noChangeAspect="1"/>
+          </p:cNvPicPr>
+          <p:nvPr/>
+        </p:nvPicPr>
+        <p:blipFill>
+          <a:blip r:embed="rId3"/>
+          <a:stretch>
+            <a:fillRect/>
+          </a:stretch>
+        </p:blipFill>
+        <p:spPr bwMode="auto">
+          <a:xfrm>
+            <a:off x="3111500" y="1816100"/>
+            <a:ext cx="5981700" cy="4343400"/>
+          </a:xfrm>
+          <a:prstGeom prst="rect">
+            <a:avLst/>
+          </a:prstGeom>
+          <a:noFill/>
+          <a:ln w="9525">
+            <a:noFill/>
+            <a:headEnd/>
+            <a:tailEnd/>
+          </a:ln>
+        </p:spPr>
+      </p:pic>
+    </p:spTree>
+  </p:cSld>
+</p:sld>
+</file>
+
+<file path=ppt/slides/slide8.xml><?xml version="1.0" encoding="utf-8"?>
+<p:sld xmlns:a="http://schemas.openxmlformats.org/drawingml/2006/main" xmlns:r="http://schemas.openxmlformats.org/officeDocument/2006/relationships" xmlns:p="http://schemas.openxmlformats.org/presentationml/2006/main">
+  <p:cSld>
+    <p:spTree>
+      <p:nvGrpSpPr>
+        <p:cNvPr id="1" name=""/>
+        <p:cNvGrpSpPr/>
+        <p:nvPr/>
+      </p:nvGrpSpPr>
+      <p:grpSpPr>
+        <a:xfrm>
+          <a:off x="0" y="0"/>
+          <a:ext cx="0" cy="0"/>
+          <a:chOff x="0" y="0"/>
+          <a:chExt cx="0" cy="0"/>
+        </a:xfrm>
+      </p:grpSpPr>
+      <p:sp>
+        <p:nvSpPr>
+          <p:cNvPr id="2" name="Title 1">
+            <a:extLst>
+              <a:ext uri="{FF2B5EF4-FFF2-40B4-BE49-F238E27FC236}">
+                <a16:creationId xmlns:a16="http://schemas.microsoft.com/office/drawing/2014/main" id="{5567D468-EE70-CD4E-A3AC-039CC11EF1FB}"/>
+              </a:ext>
+            </a:extLst>
+          </p:cNvPr>
+          <p:cNvSpPr>
+            <a:spLocks noGrp="1"/>
+          </p:cNvSpPr>
+          <p:nvPr>
+            <p:ph type="title"/>
+          </p:nvPr>
+        </p:nvSpPr>
+        <p:spPr/>
+        <p:txBody>
+          <a:bodyPr/>
+          <a:lstStyle/>
+          <a:p>
+            <a:pPr lvl="0" marL="0" indent="0">
+              <a:buNone/>
+            </a:pPr>
+            <a:r>
+              <a:rPr/>
+              <a:t>may</a:t>
+            </a:r>
+            <a:r>
+              <a:rPr/>
+              <a:t> </a:t>
+            </a:r>
+            <a:r>
+              <a:rPr/>
+              <a:t>take</a:t>
+            </a:r>
+            <a:r>
+              <a:rPr/>
+              <a:t> </a:t>
+            </a:r>
+            <a:r>
+              <a:rPr/>
+              <a:t>a</a:t>
+            </a:r>
+            <a:r>
+              <a:rPr/>
+              <a:t> </a:t>
+            </a:r>
+            <a:r>
+              <a:rPr/>
+              <a:t>while</a:t>
+            </a:r>
+            <a:r>
+              <a:rPr/>
+              <a:t> </a:t>
+            </a:r>
+            <a:r>
+              <a:rPr/>
+              <a:t>to</a:t>
+            </a:r>
+            <a:r>
+              <a:rPr/>
+              <a:t> </a:t>
+            </a:r>
+            <a:r>
+              <a:rPr/>
+              <a:t>copy</a:t>
+            </a:r>
+            <a:r>
+              <a:rPr/>
+              <a:t> </a:t>
+            </a:r>
+            <a:r>
+              <a:rPr/>
+              <a:t>files.</a:t>
+            </a:r>
+          </a:p>
+        </p:txBody>
+      </p:sp>
+      <p:pic>
+        <p:nvPicPr>
+          <p:cNvPr descr="../Images/00-05-clone-progress.png" id="0" name="Picture 1"/>
+          <p:cNvPicPr>
+            <a:picLocks noGrp="1" noChangeAspect="1"/>
+          </p:cNvPicPr>
+          <p:nvPr/>
+        </p:nvPicPr>
+        <p:blipFill>
+          <a:blip r:embed="rId2"/>
+          <a:stretch>
+            <a:fillRect/>
+          </a:stretch>
+        </p:blipFill>
+        <p:spPr bwMode="auto">
+          <a:xfrm>
+            <a:off x="1130300" y="1816100"/>
+            <a:ext cx="9918700" cy="4343400"/>
+          </a:xfrm>
+          <a:prstGeom prst="rect">
+            <a:avLst/>
+          </a:prstGeom>
+          <a:noFill/>
+          <a:ln w="9525">
+            <a:noFill/>
+            <a:headEnd/>
+            <a:tailEnd/>
+          </a:ln>
+        </p:spPr>
+      </p:pic>
     </p:spTree>
   </p:cSld>
 </p:sld>

</xml_diff>